<commit_message>
updating co co slides
</commit_message>
<xml_diff>
--- a/ClassMaterials/CohesionAndCoupling/Slides/Part1-OOD-DP4-Intro.pptx
+++ b/ClassMaterials/CohesionAndCoupling/Slides/Part1-OOD-DP4-Intro.pptx
@@ -302,7 +302,7 @@
           <a:p>
             <a:fld id="{11374350-B736-4AC1-A1E7-19777DF1B0E1}" type="datetimeFigureOut">
               <a:rPr lang="en-US" smtClean="0"/>
-              <a:t>11/22/2022</a:t>
+              <a:t>2/25/2024</a:t>
             </a:fld>
             <a:endParaRPr lang="en-US"/>
           </a:p>
@@ -966,7 +966,7 @@
           <a:p>
             <a:fld id="{50A519B0-864F-436F-AD10-563B5AD2C023}" type="datetimeFigureOut">
               <a:rPr lang="en-US" smtClean="0"/>
-              <a:t>11/22/2022</a:t>
+              <a:t>2/25/2024</a:t>
             </a:fld>
             <a:endParaRPr lang="en-US"/>
           </a:p>
@@ -1134,7 +1134,7 @@
           <a:p>
             <a:fld id="{50A519B0-864F-436F-AD10-563B5AD2C023}" type="datetimeFigureOut">
               <a:rPr lang="en-US" smtClean="0"/>
-              <a:t>11/22/2022</a:t>
+              <a:t>2/25/2024</a:t>
             </a:fld>
             <a:endParaRPr lang="en-US"/>
           </a:p>
@@ -1312,7 +1312,7 @@
           <a:p>
             <a:fld id="{50A519B0-864F-436F-AD10-563B5AD2C023}" type="datetimeFigureOut">
               <a:rPr lang="en-US" smtClean="0"/>
-              <a:t>11/22/2022</a:t>
+              <a:t>2/25/2024</a:t>
             </a:fld>
             <a:endParaRPr lang="en-US"/>
           </a:p>
@@ -1480,7 +1480,7 @@
           <a:p>
             <a:fld id="{50A519B0-864F-436F-AD10-563B5AD2C023}" type="datetimeFigureOut">
               <a:rPr lang="en-US" smtClean="0"/>
-              <a:t>11/22/2022</a:t>
+              <a:t>2/25/2024</a:t>
             </a:fld>
             <a:endParaRPr lang="en-US"/>
           </a:p>
@@ -1725,7 +1725,7 @@
           <a:p>
             <a:fld id="{50A519B0-864F-436F-AD10-563B5AD2C023}" type="datetimeFigureOut">
               <a:rPr lang="en-US" smtClean="0"/>
-              <a:t>11/22/2022</a:t>
+              <a:t>2/25/2024</a:t>
             </a:fld>
             <a:endParaRPr lang="en-US"/>
           </a:p>
@@ -2010,7 +2010,7 @@
           <a:p>
             <a:fld id="{50A519B0-864F-436F-AD10-563B5AD2C023}" type="datetimeFigureOut">
               <a:rPr lang="en-US" smtClean="0"/>
-              <a:t>11/22/2022</a:t>
+              <a:t>2/25/2024</a:t>
             </a:fld>
             <a:endParaRPr lang="en-US"/>
           </a:p>
@@ -2429,7 +2429,7 @@
           <a:p>
             <a:fld id="{50A519B0-864F-436F-AD10-563B5AD2C023}" type="datetimeFigureOut">
               <a:rPr lang="en-US" smtClean="0"/>
-              <a:t>11/22/2022</a:t>
+              <a:t>2/25/2024</a:t>
             </a:fld>
             <a:endParaRPr lang="en-US"/>
           </a:p>
@@ -2546,7 +2546,7 @@
           <a:p>
             <a:fld id="{50A519B0-864F-436F-AD10-563B5AD2C023}" type="datetimeFigureOut">
               <a:rPr lang="en-US" smtClean="0"/>
-              <a:t>11/22/2022</a:t>
+              <a:t>2/25/2024</a:t>
             </a:fld>
             <a:endParaRPr lang="en-US"/>
           </a:p>
@@ -2641,7 +2641,7 @@
           <a:p>
             <a:fld id="{50A519B0-864F-436F-AD10-563B5AD2C023}" type="datetimeFigureOut">
               <a:rPr lang="en-US" smtClean="0"/>
-              <a:t>11/22/2022</a:t>
+              <a:t>2/25/2024</a:t>
             </a:fld>
             <a:endParaRPr lang="en-US"/>
           </a:p>
@@ -2916,7 +2916,7 @@
           <a:p>
             <a:fld id="{50A519B0-864F-436F-AD10-563B5AD2C023}" type="datetimeFigureOut">
               <a:rPr lang="en-US" smtClean="0"/>
-              <a:t>11/22/2022</a:t>
+              <a:t>2/25/2024</a:t>
             </a:fld>
             <a:endParaRPr lang="en-US"/>
           </a:p>
@@ -3168,7 +3168,7 @@
           <a:p>
             <a:fld id="{50A519B0-864F-436F-AD10-563B5AD2C023}" type="datetimeFigureOut">
               <a:rPr lang="en-US" smtClean="0"/>
-              <a:t>11/22/2022</a:t>
+              <a:t>2/25/2024</a:t>
             </a:fld>
             <a:endParaRPr lang="en-US"/>
           </a:p>
@@ -3379,7 +3379,7 @@
           <a:p>
             <a:fld id="{50A519B0-864F-436F-AD10-563B5AD2C023}" type="datetimeFigureOut">
               <a:rPr lang="en-US" smtClean="0"/>
-              <a:t>11/22/2022</a:t>
+              <a:t>2/25/2024</a:t>
             </a:fld>
             <a:endParaRPr lang="en-US"/>
           </a:p>
@@ -3869,8 +3869,8 @@
         </p:nvSpPr>
         <p:spPr>
           <a:xfrm>
-            <a:off x="304800" y="6019800"/>
-            <a:ext cx="8534400" cy="609600"/>
+            <a:off x="304800" y="5335571"/>
+            <a:ext cx="8534400" cy="1293829"/>
           </a:xfrm>
           <a:prstGeom prst="rect">
             <a:avLst/>
@@ -3938,6 +3938,26 @@
                 </a:solidFill>
               </a:rPr>
               <a:t> ready!</a:t>
+            </a:r>
+          </a:p>
+          <a:p>
+            <a:r>
+              <a:rPr lang="en-US" sz="2400" dirty="0">
+                <a:solidFill>
+                  <a:srgbClr val="FFFFFF"/>
+                </a:solidFill>
+              </a:rPr>
+              <a:t>Quiz for today is:</a:t>
+            </a:r>
+          </a:p>
+          <a:p>
+            <a:r>
+              <a:rPr lang="en-US" sz="2400" i="1" dirty="0" err="1">
+                <a:solidFill>
+                  <a:srgbClr val="FFFFFF"/>
+                </a:solidFill>
+              </a:rPr>
+              <a:t>CohesionAndCouplingQuiz</a:t>
             </a:r>
             <a:endParaRPr lang="en-US" sz="2400" i="1" dirty="0"/>
           </a:p>
@@ -4113,8 +4133,12 @@
               <a:rPr lang="en-US" dirty="0"/>
             </a:br>
             <a:r>
+              <a:rPr lang="en-US" b="1" u="sng" dirty="0"/>
+              <a:t>Implementing</a:t>
+            </a:r>
+            <a:r>
               <a:rPr lang="en-US" dirty="0"/>
-              <a:t>Implementing Design 2</a:t>
+              <a:t> Design Problem 2</a:t>
             </a:r>
           </a:p>
         </p:txBody>
@@ -4149,7 +4173,7 @@
               <a:rPr lang="en-US" dirty="0">
                 <a:hlinkClick r:id="rId3"/>
               </a:rPr>
-              <a:t>https://github.com/RHIT-CSSE/csse220/tree/master/Homework/HWImplementingDesign2</a:t>
+              <a:t>https://github.com/RHIT-CSSE/csse220/tree/master/Homework/HWVaporSalesManager</a:t>
             </a:r>
             <a:endParaRPr lang="en-US" dirty="0"/>
           </a:p>
@@ -4234,13 +4258,13 @@
         </p:nvSpPr>
         <p:spPr>
           <a:xfrm>
-            <a:off x="457200" y="1600200"/>
-            <a:ext cx="8534400" cy="4525963"/>
+            <a:off x="333769" y="1600199"/>
+            <a:ext cx="5104614" cy="4525963"/>
           </a:xfrm>
         </p:spPr>
         <p:txBody>
           <a:bodyPr>
-            <a:normAutofit/>
+            <a:normAutofit fontScale="77500" lnSpcReduction="20000"/>
           </a:bodyPr>
           <a:lstStyle/>
           <a:p>
@@ -4249,7 +4273,7 @@
             </a:pPr>
             <a:r>
               <a:rPr lang="en-US" dirty="0"/>
-              <a:t>If you would like to work with a partner for the “Paired” part of Implementing Design 2:</a:t>
+              <a:t>If you are working with a partner for the “Paired” part of Implementing Design Problem 2:</a:t>
             </a:r>
           </a:p>
           <a:p>
@@ -4283,10 +4307,9 @@
               <a:buAutoNum type="arabicPeriod"/>
             </a:pPr>
             <a:r>
-              <a:rPr lang="en-US"/>
+              <a:rPr lang="en-US" dirty="0"/>
               <a:t>Find times you could work together </a:t>
             </a:r>
-            <a:endParaRPr lang="en-US" dirty="0"/>
           </a:p>
           <a:p>
             <a:endParaRPr lang="en-US" dirty="0"/>
@@ -4340,6 +4363,82 @@
           </a:extLst>
         </p:spPr>
       </p:pic>
+      <p:sp>
+        <p:nvSpPr>
+          <p:cNvPr id="5" name="TextBox 4">
+            <a:extLst>
+              <a:ext uri="{FF2B5EF4-FFF2-40B4-BE49-F238E27FC236}">
+                <a16:creationId xmlns:a16="http://schemas.microsoft.com/office/drawing/2014/main" id="{E0961C4C-E1DC-7955-F886-F6C18C23BE3F}"/>
+              </a:ext>
+            </a:extLst>
+          </p:cNvPr>
+          <p:cNvSpPr txBox="1"/>
+          <p:nvPr/>
+        </p:nvSpPr>
+        <p:spPr>
+          <a:xfrm>
+            <a:off x="5816338" y="1857080"/>
+            <a:ext cx="2870462" cy="3416320"/>
+          </a:xfrm>
+          <a:prstGeom prst="rect">
+            <a:avLst/>
+          </a:prstGeom>
+          <a:noFill/>
+          <a:ln>
+            <a:solidFill>
+              <a:schemeClr val="tx1"/>
+            </a:solidFill>
+          </a:ln>
+        </p:spPr>
+        <p:txBody>
+          <a:bodyPr wrap="square" rtlCol="0">
+            <a:spAutoFit/>
+          </a:bodyPr>
+          <a:lstStyle/>
+          <a:p>
+            <a:r>
+              <a:rPr lang="en-US" dirty="0"/>
+              <a:t>INSTRUCTOR</a:t>
+            </a:r>
+          </a:p>
+          <a:p>
+            <a:endParaRPr lang="en-US" dirty="0"/>
+          </a:p>
+          <a:p>
+            <a:r>
+              <a:rPr lang="en-US" dirty="0"/>
+              <a:t>Insert  Teams Here</a:t>
+            </a:r>
+          </a:p>
+          <a:p>
+            <a:endParaRPr lang="en-US" dirty="0"/>
+          </a:p>
+          <a:p>
+            <a:endParaRPr lang="en-US" dirty="0"/>
+          </a:p>
+          <a:p>
+            <a:endParaRPr lang="en-US" dirty="0"/>
+          </a:p>
+          <a:p>
+            <a:endParaRPr lang="en-US" dirty="0"/>
+          </a:p>
+          <a:p>
+            <a:endParaRPr lang="en-US" dirty="0"/>
+          </a:p>
+          <a:p>
+            <a:endParaRPr lang="en-US" dirty="0"/>
+          </a:p>
+          <a:p>
+            <a:endParaRPr lang="en-US" dirty="0"/>
+          </a:p>
+          <a:p>
+            <a:endParaRPr lang="en-US" dirty="0"/>
+          </a:p>
+          <a:p>
+            <a:endParaRPr lang="en-US" dirty="0"/>
+          </a:p>
+        </p:txBody>
+      </p:sp>
     </p:spTree>
     <p:extLst>
       <p:ext uri="{BB962C8B-B14F-4D97-AF65-F5344CB8AC3E}">
@@ -6499,21 +6598,6 @@
 </file>
 
 <file path=customXml/item1.xml><?xml version="1.0" encoding="utf-8"?>
-<p:properties xmlns:p="http://schemas.microsoft.com/office/2006/metadata/properties" xmlns:xsi="http://www.w3.org/2001/XMLSchema-instance" xmlns:pc="http://schemas.microsoft.com/office/infopath/2007/PartnerControls">
-  <documentManagement/>
-</p:properties>
-</file>
-
-<file path=customXml/item2.xml><?xml version="1.0" encoding="utf-8"?>
-<?mso-contentType ?>
-<FormTemplates xmlns="http://schemas.microsoft.com/sharepoint/v3/contenttype/forms">
-  <Display>DocumentLibraryForm</Display>
-  <Edit>DocumentLibraryForm</Edit>
-  <New>DocumentLibraryForm</New>
-</FormTemplates>
-</file>
-
-<file path=customXml/item3.xml><?xml version="1.0" encoding="utf-8"?>
 <ct:contentTypeSchema xmlns:ct="http://schemas.microsoft.com/office/2006/metadata/contentType" xmlns:ma="http://schemas.microsoft.com/office/2006/metadata/properties/metaAttributes" ct:_="" ma:_="" ma:contentTypeName="Document" ma:contentTypeID="0x0101001570BCAAD2E4294F9443DCB038A55380" ma:contentTypeVersion="8" ma:contentTypeDescription="Create a new document." ma:contentTypeScope="" ma:versionID="9523c79d6bab9e2ad858b5223ec5ed94">
   <xsd:schema xmlns:xsd="http://www.w3.org/2001/XMLSchema" xmlns:xs="http://www.w3.org/2001/XMLSchema" xmlns:p="http://schemas.microsoft.com/office/2006/metadata/properties" xmlns:ns2="201674f6-2bdd-4f13-ba1e-424e4aa70473" targetNamespace="http://schemas.microsoft.com/office/2006/metadata/properties" ma:root="true" ma:fieldsID="587afc94f70b507ec5be5f4d78229b0b" ns2:_="">
     <xsd:import namespace="201674f6-2bdd-4f13-ba1e-424e4aa70473"/>
@@ -6683,24 +6767,22 @@
 </ct:contentTypeSchema>
 </file>
 
-<file path=customXml/itemProps1.xml><?xml version="1.0" encoding="utf-8"?>
-<ds:datastoreItem xmlns:ds="http://schemas.openxmlformats.org/officeDocument/2006/customXml" ds:itemID="{991297AD-09B4-48F4-A74A-E2F1A2E57F07}">
-  <ds:schemaRefs>
-    <ds:schemaRef ds:uri="http://schemas.microsoft.com/office/2006/metadata/properties"/>
-    <ds:schemaRef ds:uri="http://schemas.microsoft.com/office/infopath/2007/PartnerControls"/>
-  </ds:schemaRefs>
-</ds:datastoreItem>
+<file path=customXml/item2.xml><?xml version="1.0" encoding="utf-8"?>
+<p:properties xmlns:p="http://schemas.microsoft.com/office/2006/metadata/properties" xmlns:xsi="http://www.w3.org/2001/XMLSchema-instance" xmlns:pc="http://schemas.microsoft.com/office/infopath/2007/PartnerControls">
+  <documentManagement/>
+</p:properties>
 </file>
 
-<file path=customXml/itemProps2.xml><?xml version="1.0" encoding="utf-8"?>
-<ds:datastoreItem xmlns:ds="http://schemas.openxmlformats.org/officeDocument/2006/customXml" ds:itemID="{3D88F84C-A15C-4D5E-8101-314F782FE478}">
-  <ds:schemaRefs>
-    <ds:schemaRef ds:uri="http://schemas.microsoft.com/sharepoint/v3/contenttype/forms"/>
-  </ds:schemaRefs>
-</ds:datastoreItem>
+<file path=customXml/item3.xml><?xml version="1.0" encoding="utf-8"?>
+<?mso-contentType ?>
+<FormTemplates xmlns="http://schemas.microsoft.com/sharepoint/v3/contenttype/forms">
+  <Display>DocumentLibraryForm</Display>
+  <Edit>DocumentLibraryForm</Edit>
+  <New>DocumentLibraryForm</New>
+</FormTemplates>
 </file>
 
-<file path=customXml/itemProps3.xml><?xml version="1.0" encoding="utf-8"?>
+<file path=customXml/itemProps1.xml><?xml version="1.0" encoding="utf-8"?>
 <ds:datastoreItem xmlns:ds="http://schemas.openxmlformats.org/officeDocument/2006/customXml" ds:itemID="{879406AE-5713-4671-BBC1-437712C87BAB}">
   <ds:schemaRefs>
     <ds:schemaRef ds:uri="http://schemas.microsoft.com/office/2006/metadata/contentType"/>
@@ -6716,4 +6798,21 @@
     <ds:schemaRef ds:uri="http://schemas.microsoft.com/internal/obd"/>
   </ds:schemaRefs>
 </ds:datastoreItem>
+</file>
+
+<file path=customXml/itemProps2.xml><?xml version="1.0" encoding="utf-8"?>
+<ds:datastoreItem xmlns:ds="http://schemas.openxmlformats.org/officeDocument/2006/customXml" ds:itemID="{991297AD-09B4-48F4-A74A-E2F1A2E57F07}">
+  <ds:schemaRefs>
+    <ds:schemaRef ds:uri="http://schemas.microsoft.com/office/2006/metadata/properties"/>
+    <ds:schemaRef ds:uri="http://schemas.microsoft.com/office/infopath/2007/PartnerControls"/>
+  </ds:schemaRefs>
+</ds:datastoreItem>
+</file>
+
+<file path=customXml/itemProps3.xml><?xml version="1.0" encoding="utf-8"?>
+<ds:datastoreItem xmlns:ds="http://schemas.openxmlformats.org/officeDocument/2006/customXml" ds:itemID="{3D88F84C-A15C-4D5E-8101-314F782FE478}">
+  <ds:schemaRefs>
+    <ds:schemaRef ds:uri="http://schemas.microsoft.com/sharepoint/v3/contenttype/forms"/>
+  </ds:schemaRefs>
+</ds:datastoreItem>
 </file>
</xml_diff>